<commit_message>
Added notes, updated slides, and updated README
</commit_message>
<xml_diff>
--- a/Causation.pptx
+++ b/Causation.pptx
@@ -15712,6 +15712,128 @@
           </a:p>
         </p:txBody>
       </p:sp>
+      <p:grpSp>
+        <p:nvGrpSpPr>
+          <p:cNvPr id="27" name="Group 26"/>
+          <p:cNvGrpSpPr/>
+          <p:nvPr/>
+        </p:nvGrpSpPr>
+        <p:grpSpPr>
+          <a:xfrm>
+            <a:off x="6722914" y="1923061"/>
+            <a:ext cx="2421086" cy="2658551"/>
+            <a:chOff x="6722914" y="1923061"/>
+            <a:chExt cx="2421086" cy="2658551"/>
+          </a:xfrm>
+        </p:grpSpPr>
+        <p:sp>
+          <p:nvSpPr>
+            <p:cNvPr id="2" name="Right Bracket 1"/>
+            <p:cNvSpPr/>
+            <p:nvPr/>
+          </p:nvSpPr>
+          <p:spPr>
+            <a:xfrm>
+              <a:off x="6722914" y="1923061"/>
+              <a:ext cx="384999" cy="2658551"/>
+            </a:xfrm>
+            <a:prstGeom prst="rightBracket">
+              <a:avLst/>
+            </a:prstGeom>
+            <a:ln w="76200" cmpd="sng"/>
+          </p:spPr>
+          <p:style>
+            <a:lnRef idx="2">
+              <a:schemeClr val="accent1"/>
+            </a:lnRef>
+            <a:fillRef idx="0">
+              <a:schemeClr val="accent1"/>
+            </a:fillRef>
+            <a:effectRef idx="1">
+              <a:schemeClr val="accent1"/>
+            </a:effectRef>
+            <a:fontRef idx="minor">
+              <a:schemeClr val="tx1"/>
+            </a:fontRef>
+          </p:style>
+          <p:txBody>
+            <a:bodyPr rtlCol="0" anchor="ctr"/>
+            <a:lstStyle/>
+            <a:p>
+              <a:pPr algn="ctr"/>
+              <a:endParaRPr lang="en-US"/>
+            </a:p>
+          </p:txBody>
+        </p:sp>
+        <p:sp>
+          <p:nvSpPr>
+            <p:cNvPr id="26" name="TextBox 25"/>
+            <p:cNvSpPr txBox="1"/>
+            <p:nvPr/>
+          </p:nvSpPr>
+          <p:spPr>
+            <a:xfrm>
+              <a:off x="7225691" y="2107780"/>
+              <a:ext cx="1918309" cy="1938992"/>
+            </a:xfrm>
+            <a:prstGeom prst="rect">
+              <a:avLst/>
+            </a:prstGeom>
+            <a:noFill/>
+          </p:spPr>
+          <p:txBody>
+            <a:bodyPr wrap="square" rtlCol="0">
+              <a:spAutoFit/>
+            </a:bodyPr>
+            <a:lstStyle/>
+            <a:p>
+              <a:r>
+                <a:rPr lang="en-US" sz="2400" dirty="0" smtClean="0"/>
+                <a:t>Dependent given no information. Independent given B.</a:t>
+              </a:r>
+              <a:endParaRPr lang="en-US" sz="2400" dirty="0"/>
+            </a:p>
+          </p:txBody>
+        </p:sp>
+      </p:grpSp>
+      <p:sp>
+        <p:nvSpPr>
+          <p:cNvPr id="28" name="TextBox 27"/>
+          <p:cNvSpPr txBox="1"/>
+          <p:nvPr/>
+        </p:nvSpPr>
+        <p:spPr>
+          <a:xfrm>
+            <a:off x="7225691" y="4936723"/>
+            <a:ext cx="1918309" cy="1938992"/>
+          </a:xfrm>
+          <a:prstGeom prst="rect">
+            <a:avLst/>
+          </a:prstGeom>
+          <a:noFill/>
+        </p:spPr>
+        <p:txBody>
+          <a:bodyPr wrap="square" rtlCol="0">
+            <a:spAutoFit/>
+          </a:bodyPr>
+          <a:lstStyle/>
+          <a:p>
+            <a:r>
+              <a:rPr lang="en-US" sz="2400" dirty="0" smtClean="0"/>
+              <a:t>Independent given no information. </a:t>
+            </a:r>
+            <a:r>
+              <a:rPr lang="en-US" sz="2400" dirty="0"/>
+              <a:t>D</a:t>
+            </a:r>
+            <a:r>
+              <a:rPr lang="en-US" sz="2400" dirty="0" smtClean="0"/>
+              <a:t>ependent given B.</a:t>
+            </a:r>
+            <a:endParaRPr lang="en-US" sz="2400" dirty="0"/>
+          </a:p>
+        </p:txBody>
+      </p:sp>
     </p:spTree>
     <p:extLst>
       <p:ext uri="{BB962C8B-B14F-4D97-AF65-F5344CB8AC3E}">
@@ -16000,6 +16122,96 @@
                       </p:childTnLst>
                     </p:cTn>
                   </p:par>
+                  <p:par>
+                    <p:cTn id="27" fill="hold">
+                      <p:stCondLst>
+                        <p:cond delay="indefinite"/>
+                      </p:stCondLst>
+                      <p:childTnLst>
+                        <p:par>
+                          <p:cTn id="28" fill="hold">
+                            <p:stCondLst>
+                              <p:cond delay="0"/>
+                            </p:stCondLst>
+                            <p:childTnLst>
+                              <p:par>
+                                <p:cTn id="29" presetID="1" presetClass="entr" presetSubtype="0" fill="hold" nodeType="clickEffect">
+                                  <p:stCondLst>
+                                    <p:cond delay="0"/>
+                                  </p:stCondLst>
+                                  <p:childTnLst>
+                                    <p:set>
+                                      <p:cBhvr>
+                                        <p:cTn id="30" dur="1" fill="hold">
+                                          <p:stCondLst>
+                                            <p:cond delay="0"/>
+                                          </p:stCondLst>
+                                        </p:cTn>
+                                        <p:tgtEl>
+                                          <p:spTgt spid="27"/>
+                                        </p:tgtEl>
+                                        <p:attrNameLst>
+                                          <p:attrName>style.visibility</p:attrName>
+                                        </p:attrNameLst>
+                                      </p:cBhvr>
+                                      <p:to>
+                                        <p:strVal val="visible"/>
+                                      </p:to>
+                                    </p:set>
+                                  </p:childTnLst>
+                                </p:cTn>
+                              </p:par>
+                            </p:childTnLst>
+                          </p:cTn>
+                        </p:par>
+                      </p:childTnLst>
+                    </p:cTn>
+                  </p:par>
+                  <p:par>
+                    <p:cTn id="31" fill="hold">
+                      <p:stCondLst>
+                        <p:cond delay="indefinite"/>
+                      </p:stCondLst>
+                      <p:childTnLst>
+                        <p:par>
+                          <p:cTn id="32" fill="hold">
+                            <p:stCondLst>
+                              <p:cond delay="0"/>
+                            </p:stCondLst>
+                            <p:childTnLst>
+                              <p:par>
+                                <p:cTn id="33" presetID="1" presetClass="entr" presetSubtype="0" fill="hold" grpId="0" nodeType="clickEffect">
+                                  <p:stCondLst>
+                                    <p:cond delay="0"/>
+                                  </p:stCondLst>
+                                  <p:childTnLst>
+                                    <p:set>
+                                      <p:cBhvr>
+                                        <p:cTn id="34" dur="1" fill="hold">
+                                          <p:stCondLst>
+                                            <p:cond delay="0"/>
+                                          </p:stCondLst>
+                                        </p:cTn>
+                                        <p:tgtEl>
+                                          <p:spTgt spid="28"/>
+                                        </p:tgtEl>
+                                        <p:attrNameLst>
+                                          <p:attrName>style.visibility</p:attrName>
+                                        </p:attrNameLst>
+                                      </p:cBhvr>
+                                      <p:to>
+                                        <p:strVal val="visible"/>
+                                      </p:to>
+                                    </p:set>
+                                  </p:childTnLst>
+                                </p:cTn>
+                              </p:par>
+                            </p:childTnLst>
+                          </p:cTn>
+                        </p:par>
+                      </p:childTnLst>
+                    </p:cTn>
+                  </p:par>
                 </p:childTnLst>
               </p:cTn>
               <p:prevCondLst>
@@ -16025,6 +16237,7 @@
       <p:bldP spid="14" grpId="0" animBg="1"/>
       <p:bldP spid="23" grpId="0" animBg="1"/>
       <p:bldP spid="24" grpId="0" animBg="1"/>
+      <p:bldP spid="28" grpId="0"/>
     </p:bldLst>
   </p:timing>
 </p:sld>
@@ -17743,7 +17956,7 @@
           <a:graphicData uri="http://schemas.openxmlformats.org/presentationml/2006/ole">
             <mc:AlternateContent xmlns:mc="http://schemas.openxmlformats.org/markup-compatibility/2006">
               <mc:Choice xmlns:v="urn:schemas-microsoft-com:vml" Requires="v">
-                <p:oleObj spid="_x0000_s1028" name="Document" r:id="rId3" imgW="5486400" imgH="1219200" progId="Word.Document.12">
+                <p:oleObj spid="_x0000_s1050" name="Document" r:id="rId3" imgW="5486400" imgH="1219200" progId="Word.Document.12">
                   <p:embed/>
                 </p:oleObj>
               </mc:Choice>
@@ -20981,7 +21194,7 @@
             <p:ph idx="1"/>
             <p:extLst>
               <p:ext uri="{D42A27DB-BD31-4B8C-83A1-F6EECF244321}">
-                <p14:modId xmlns:p14="http://schemas.microsoft.com/office/powerpoint/2010/main" val="4023140223"/>
+                <p14:modId xmlns:p14="http://schemas.microsoft.com/office/powerpoint/2010/main" val="3776864959"/>
               </p:ext>
             </p:extLst>
           </p:nvPr>
@@ -21024,7 +21237,7 @@
                       <a:pPr algn="ctr"/>
                       <a:r>
                         <a:rPr lang="en-US" dirty="0" smtClean="0"/>
-                        <a:t>Giraffe A</a:t>
+                        <a:t>Graph A</a:t>
                       </a:r>
                       <a:endParaRPr lang="en-US" dirty="0"/>
                     </a:p>
@@ -21039,7 +21252,7 @@
                       <a:pPr algn="ctr"/>
                       <a:r>
                         <a:rPr lang="en-US" dirty="0" smtClean="0"/>
-                        <a:t>Giraffe B</a:t>
+                        <a:t>Graph B</a:t>
                       </a:r>
                       <a:endParaRPr lang="en-US" dirty="0"/>
                     </a:p>
@@ -21688,12 +21901,20 @@
           </a:xfrm>
         </p:spPr>
         <p:txBody>
-          <a:bodyPr/>
+          <a:bodyPr>
+            <a:normAutofit lnSpcReduction="10000"/>
+          </a:bodyPr>
           <a:lstStyle/>
           <a:p>
             <a:r>
               <a:rPr lang="en-US" dirty="0" smtClean="0"/>
               <a:t>Probabilistic Causation: If X is the causal variable and Y is the effect variable, then a change in the VALUE of X results in a change in the DISTRIBUTION of Y.</a:t>
+            </a:r>
+          </a:p>
+          <a:p>
+            <a:r>
+              <a:rPr lang="en-US" dirty="0" smtClean="0"/>
+              <a:t>If X and Y are events, X should precede Y temporally, and the causal relation is anti-symmetric.</a:t>
             </a:r>
           </a:p>
           <a:p>
@@ -21875,6 +22096,55 @@
                                           <p:spTgt spid="8">
                                             <p:txEl>
                                               <p:pRg st="2" end="2"/>
+                                            </p:txEl>
+                                          </p:spTgt>
+                                        </p:tgtEl>
+                                        <p:attrNameLst>
+                                          <p:attrName>style.visibility</p:attrName>
+                                        </p:attrNameLst>
+                                      </p:cBhvr>
+                                      <p:to>
+                                        <p:strVal val="visible"/>
+                                      </p:to>
+                                    </p:set>
+                                  </p:childTnLst>
+                                </p:cTn>
+                              </p:par>
+                            </p:childTnLst>
+                          </p:cTn>
+                        </p:par>
+                      </p:childTnLst>
+                    </p:cTn>
+                  </p:par>
+                  <p:par>
+                    <p:cTn id="15" fill="hold">
+                      <p:stCondLst>
+                        <p:cond delay="indefinite"/>
+                      </p:stCondLst>
+                      <p:childTnLst>
+                        <p:par>
+                          <p:cTn id="16" fill="hold">
+                            <p:stCondLst>
+                              <p:cond delay="0"/>
+                            </p:stCondLst>
+                            <p:childTnLst>
+                              <p:par>
+                                <p:cTn id="17" presetID="1" presetClass="entr" presetSubtype="0" fill="hold" grpId="0" nodeType="clickEffect">
+                                  <p:stCondLst>
+                                    <p:cond delay="0"/>
+                                  </p:stCondLst>
+                                  <p:childTnLst>
+                                    <p:set>
+                                      <p:cBhvr>
+                                        <p:cTn id="18" dur="1" fill="hold">
+                                          <p:stCondLst>
+                                            <p:cond delay="0"/>
+                                          </p:stCondLst>
+                                        </p:cTn>
+                                        <p:tgtEl>
+                                          <p:spTgt spid="8">
+                                            <p:txEl>
+                                              <p:pRg st="3" end="3"/>
                                             </p:txEl>
                                           </p:spTgt>
                                         </p:tgtEl>
@@ -26340,37 +26610,49 @@
           <a:lstStyle/>
           <a:p>
             <a:r>
-              <a:rPr lang="en-US" dirty="0" smtClean="0"/>
-              <a:t>Causality: Models, Reasoning, and Inference by Judea Pearl.</a:t>
-            </a:r>
-          </a:p>
-          <a:p>
-            <a:r>
-              <a:rPr lang="en-US" dirty="0" smtClean="0"/>
-              <a:t>Causation, Prediction, Search by Peter Sprites, Clark </a:t>
-            </a:r>
-            <a:r>
-              <a:rPr lang="en-US" dirty="0" err="1" smtClean="0"/>
-              <a:t>Glymour</a:t>
-            </a:r>
-            <a:r>
-              <a:rPr lang="en-US" dirty="0" smtClean="0"/>
-              <a:t>, and Richard </a:t>
-            </a:r>
-            <a:r>
-              <a:rPr lang="en-US" dirty="0" err="1" smtClean="0"/>
-              <a:t>Scheines</a:t>
-            </a:r>
-            <a:r>
-              <a:rPr lang="en-US" dirty="0" smtClean="0"/>
-              <a:t>.</a:t>
-            </a:r>
-          </a:p>
-          <a:p>
-            <a:r>
               <a:rPr lang="en-US" dirty="0" smtClean="0">
                 <a:hlinkClick r:id="rId2"/>
               </a:rPr>
+              <a:t>Causality: Models, Reasoning, and Inference </a:t>
+            </a:r>
+            <a:r>
+              <a:rPr lang="en-US" dirty="0" smtClean="0"/>
+              <a:t>by Judea Pearl.</a:t>
+            </a:r>
+          </a:p>
+          <a:p>
+            <a:r>
+              <a:rPr lang="en-US" dirty="0" smtClean="0">
+                <a:hlinkClick r:id="rId3"/>
+              </a:rPr>
+              <a:t>Causation, Prediction, Search </a:t>
+            </a:r>
+            <a:r>
+              <a:rPr lang="en-US" dirty="0" smtClean="0"/>
+              <a:t>by Peter Sprites, Clark </a:t>
+            </a:r>
+            <a:r>
+              <a:rPr lang="en-US" dirty="0" err="1" smtClean="0"/>
+              <a:t>Glymour</a:t>
+            </a:r>
+            <a:r>
+              <a:rPr lang="en-US" dirty="0" smtClean="0"/>
+              <a:t>, and Richard </a:t>
+            </a:r>
+            <a:r>
+              <a:rPr lang="en-US" dirty="0" err="1" smtClean="0"/>
+              <a:t>Scheines</a:t>
+            </a:r>
+            <a:r>
+              <a:rPr lang="en-US" dirty="0" smtClean="0"/>
+              <a:t>.</a:t>
+            </a:r>
+          </a:p>
+          <a:p>
+            <a:r>
+              <a:rPr lang="en-US" dirty="0" smtClean="0">
+                <a:hlinkClick r:id="rId4"/>
+              </a:rPr>
               <a:t>Causal Inference and Direct Effect </a:t>
             </a:r>
             <a:r>
@@ -26383,7 +26665,62 @@
             </a:r>
             <a:r>
               <a:rPr lang="en-US" dirty="0" smtClean="0"/>
-              <a:t> Labs</a:t>
+              <a:t> </a:t>
+            </a:r>
+            <a:r>
+              <a:rPr lang="en-US" dirty="0" smtClean="0"/>
+              <a:t>Labs</a:t>
+            </a:r>
+          </a:p>
+          <a:p>
+            <a:r>
+              <a:rPr lang="en-US" dirty="0" smtClean="0">
+                <a:hlinkClick r:id="rId5"/>
+              </a:rPr>
+              <a:t>Causal Inference Book </a:t>
+            </a:r>
+            <a:r>
+              <a:rPr lang="en-US" dirty="0" smtClean="0"/>
+              <a:t>by Miguel </a:t>
+            </a:r>
+            <a:r>
+              <a:rPr lang="en-US" dirty="0" err="1" smtClean="0"/>
+              <a:t>Hernan</a:t>
+            </a:r>
+            <a:endParaRPr lang="en-US" dirty="0" smtClean="0"/>
+          </a:p>
+          <a:p>
+            <a:r>
+              <a:rPr lang="en-US" dirty="0" smtClean="0"/>
+              <a:t>Notes by Cosmos </a:t>
+            </a:r>
+            <a:r>
+              <a:rPr lang="en-US" dirty="0" err="1" smtClean="0"/>
+              <a:t>Shalizi</a:t>
+            </a:r>
+            <a:r>
+              <a:rPr lang="en-US" dirty="0" smtClean="0"/>
+              <a:t> included in </a:t>
+            </a:r>
+            <a:r>
+              <a:rPr lang="en-US" dirty="0" err="1" smtClean="0"/>
+              <a:t>GitHub</a:t>
+            </a:r>
+            <a:r>
+              <a:rPr lang="en-US" dirty="0" smtClean="0"/>
+              <a:t> repo.</a:t>
+            </a:r>
+          </a:p>
+          <a:p>
+            <a:r>
+              <a:rPr lang="en-US" dirty="0" smtClean="0">
+                <a:hlinkClick r:id="rId6"/>
+              </a:rPr>
+              <a:t>Talk by Judea Pearl </a:t>
+            </a:r>
+            <a:r>
+              <a:rPr lang="en-US" dirty="0" smtClean="0"/>
+              <a:t>in April</a:t>
             </a:r>
             <a:endParaRPr lang="en-US" dirty="0"/>
           </a:p>
@@ -26488,7 +26825,27 @@
                 <a:latin typeface="Times New Roman"/>
                 <a:cs typeface="Times New Roman"/>
               </a:rPr>
-              <a:t>X := f(Parents(X), error)</a:t>
+              <a:t>X := f(</a:t>
+            </a:r>
+            <a:r>
+              <a:rPr lang="en-US" dirty="0" err="1" smtClean="0">
+                <a:solidFill>
+                  <a:srgbClr val="FF0000"/>
+                </a:solidFill>
+                <a:latin typeface="Times New Roman"/>
+                <a:cs typeface="Times New Roman"/>
+              </a:rPr>
+              <a:t>DirectCauses</a:t>
+            </a:r>
+            <a:r>
+              <a:rPr lang="en-US" dirty="0" smtClean="0">
+                <a:solidFill>
+                  <a:srgbClr val="FF0000"/>
+                </a:solidFill>
+                <a:latin typeface="Times New Roman"/>
+                <a:cs typeface="Times New Roman"/>
+              </a:rPr>
+              <a:t>(X), error)</a:t>
             </a:r>
           </a:p>
           <a:p>
@@ -26520,7 +26877,7 @@
                 <a:latin typeface="Times New Roman"/>
                 <a:cs typeface="Times New Roman"/>
               </a:rPr>
-              <a:t>1*Income + </a:t>
+              <a:t>1*Education + </a:t>
             </a:r>
             <a:r>
               <a:rPr lang="el-GR" dirty="0" smtClean="0">
@@ -27001,6 +27358,28 @@
             <a:r>
               <a:rPr lang="en-US" dirty="0" smtClean="0"/>
               <a:t>(Y|X)</a:t>
+            </a:r>
+          </a:p>
+          <a:p>
+            <a:r>
+              <a:rPr lang="en-US" dirty="0" smtClean="0"/>
+              <a:t>Causal Effect: E[</a:t>
+            </a:r>
+            <a:r>
+              <a:rPr lang="en-US" dirty="0" err="1" smtClean="0"/>
+              <a:t>Y|do</a:t>
+            </a:r>
+            <a:r>
+              <a:rPr lang="en-US" dirty="0" smtClean="0"/>
+              <a:t>(X=a)] – E[</a:t>
+            </a:r>
+            <a:r>
+              <a:rPr lang="en-US" dirty="0" err="1" smtClean="0"/>
+              <a:t>Y|do</a:t>
+            </a:r>
+            <a:r>
+              <a:rPr lang="en-US" dirty="0" smtClean="0"/>
+              <a:t>(X=b)]</a:t>
             </a:r>
           </a:p>
           <a:p>

</xml_diff>